<commit_message>
add image support, fix some bugs
</commit_message>
<xml_diff>
--- a/output.pptx
+++ b/output.pptx
@@ -3104,31 +3104,46 @@
             <a:spLocks noGrp="1"/>
           </p:cNvSpPr>
           <p:nvPr>
-            <p:ph type="ctrTitle"/>
-          </p:nvPr>
-        </p:nvSpPr>
-        <p:spPr/>
-        <p:txBody>
-          <a:bodyPr/>
-          <a:lstStyle/>
-          <a:p/>
-        </p:txBody>
-      </p:sp>
-      <p:sp>
-        <p:nvSpPr>
-          <p:cNvPr id="3" name="Subtitle 2"/>
-          <p:cNvSpPr>
-            <a:spLocks noGrp="1"/>
-          </p:cNvSpPr>
-          <p:nvPr>
-            <p:ph type="subTitle" idx="1"/>
-          </p:nvPr>
-        </p:nvSpPr>
-        <p:spPr/>
-        <p:txBody>
-          <a:bodyPr/>
-          <a:lstStyle/>
-          <a:p/>
+            <p:ph type="title"/>
+          </p:nvPr>
+        </p:nvSpPr>
+        <p:spPr/>
+        <p:txBody>
+          <a:bodyPr/>
+          <a:lstStyle/>
+          <a:p>
+            <a:r>
+              <a:t>A Slides Presentation</a:t>
+            </a:r>
+          </a:p>
+        </p:txBody>
+      </p:sp>
+      <p:sp>
+        <p:nvSpPr>
+          <p:cNvPr id="3" name="TextBox 2"/>
+          <p:cNvSpPr txBox="1"/>
+          <p:nvPr/>
+        </p:nvSpPr>
+        <p:spPr>
+          <a:xfrm>
+            <a:off x="914400" y="1828800"/>
+            <a:ext cx="12801600" cy="914400"/>
+          </a:xfrm>
+          <a:prstGeom prst="rect">
+            <a:avLst/>
+          </a:prstGeom>
+          <a:noFill/>
+        </p:spPr>
+        <p:txBody>
+          <a:bodyPr wrap="none">
+            <a:spAutoFit/>
+          </a:bodyPr>
+          <a:lstStyle/>
+          <a:p>
+            <a:r>
+              <a:t>Created Using PresentLang</a:t>
+            </a:r>
+          </a:p>
         </p:txBody>
       </p:sp>
     </p:spTree>
@@ -3164,33 +3179,65 @@
             <a:spLocks noGrp="1"/>
           </p:cNvSpPr>
           <p:nvPr>
-            <p:ph type="ctrTitle"/>
-          </p:nvPr>
-        </p:nvSpPr>
-        <p:spPr/>
-        <p:txBody>
-          <a:bodyPr/>
-          <a:lstStyle/>
-          <a:p/>
-        </p:txBody>
-      </p:sp>
-      <p:sp>
-        <p:nvSpPr>
-          <p:cNvPr id="3" name="Subtitle 2"/>
-          <p:cNvSpPr>
-            <a:spLocks noGrp="1"/>
-          </p:cNvSpPr>
-          <p:nvPr>
-            <p:ph type="subTitle" idx="1"/>
-          </p:nvPr>
-        </p:nvSpPr>
-        <p:spPr/>
-        <p:txBody>
-          <a:bodyPr/>
-          <a:lstStyle/>
-          <a:p/>
-        </p:txBody>
-      </p:sp>
+            <p:ph type="title"/>
+          </p:nvPr>
+        </p:nvSpPr>
+        <p:spPr/>
+        <p:txBody>
+          <a:bodyPr/>
+          <a:lstStyle/>
+          <a:p>
+            <a:r>
+              <a:t>PresentLang Benefits</a:t>
+            </a:r>
+          </a:p>
+        </p:txBody>
+      </p:sp>
+      <p:sp>
+        <p:nvSpPr>
+          <p:cNvPr id="3" name="Text Placeholder 2"/>
+          <p:cNvSpPr>
+            <a:spLocks noGrp="1"/>
+          </p:cNvSpPr>
+          <p:nvPr>
+            <p:ph type="body" idx="1"/>
+          </p:nvPr>
+        </p:nvSpPr>
+        <p:spPr/>
+        <p:txBody>
+          <a:bodyPr/>
+          <a:lstStyle/>
+          <a:p>
+            <a:r>
+              <a:t>PresentLang makes creating presentations similar to html, where you can simply type away.</a:t>
+            </a:r>
+          </a:p>
+        </p:txBody>
+      </p:sp>
+      <p:pic>
+        <p:nvPicPr>
+          <p:cNvPr id="4" name="Picture 3" descr="exampleimg.png"/>
+          <p:cNvPicPr>
+            <a:picLocks noChangeAspect="1"/>
+          </p:cNvPicPr>
+          <p:nvPr/>
+        </p:nvPicPr>
+        <p:blipFill>
+          <a:blip r:embed="rId2"/>
+          <a:stretch>
+            <a:fillRect/>
+          </a:stretch>
+        </p:blipFill>
+        <p:spPr>
+          <a:xfrm>
+            <a:off x="7315200" y="1828800"/>
+            <a:ext cx="7315200" cy="4114800"/>
+          </a:xfrm>
+          <a:prstGeom prst="rect">
+            <a:avLst/>
+          </a:prstGeom>
+        </p:spPr>
+      </p:pic>
     </p:spTree>
   </p:cSld>
   <p:clrMapOvr>

</xml_diff>